<commit_message>
Checking commit and push from laptop.
</commit_message>
<xml_diff>
--- a/ProblemStatements/FindPairsCarryForward.pptx
+++ b/ProblemStatements/FindPairsCarryForward.pptx
@@ -1,11 +1,11 @@
 
 <file path=ppt/presentation.xml><?xml version="1.0" encoding="utf-8"?>
-<p:presentation xmlns:a="http://schemas.openxmlformats.org/drawingml/2006/main" xmlns:r="http://schemas.openxmlformats.org/officeDocument/2006/relationships" xmlns:p="http://schemas.openxmlformats.org/presentationml/2006/main" saveSubsetFonts="1">
+<p:presentation xmlns:a="http://schemas.openxmlformats.org/drawingml/2006/main" xmlns:r="http://schemas.openxmlformats.org/officeDocument/2006/relationships" xmlns:p="http://schemas.openxmlformats.org/presentationml/2006/main">
   <p:sldMasterIdLst>
     <p:sldMasterId id="2147483648" r:id="rId1"/>
   </p:sldMasterIdLst>
   <p:sldIdLst>
-    <p:sldId id="256" r:id="rId2"/>
+    <p:sldId id="256" r:id="rId3"/>
   </p:sldIdLst>
   <p:sldSz cx="12192000" cy="6858000"/>
   <p:notesSz cx="6858000" cy="9144000"/>
@@ -238,7 +238,6 @@
           <a:p>
             <a:fld id="{78099C12-A812-49AC-8A33-AFD6AE6D3516}" type="datetimeFigureOut">
               <a:rPr lang="en-IN" smtClean="0"/>
-              <a:t>07-07-2025</a:t>
             </a:fld>
             <a:endParaRPr lang="en-IN"/>
           </a:p>
@@ -280,18 +279,12 @@
           <a:p>
             <a:fld id="{E6B53E62-7547-4589-B4FC-0807C1B957EC}" type="slidenum">
               <a:rPr lang="en-IN" smtClean="0"/>
-              <a:t>‹#›</a:t>
             </a:fld>
             <a:endParaRPr lang="en-IN"/>
           </a:p>
         </p:txBody>
       </p:sp>
     </p:spTree>
-    <p:extLst>
-      <p:ext uri="{BB962C8B-B14F-4D97-AF65-F5344CB8AC3E}">
-        <p14:creationId xmlns:p14="http://schemas.microsoft.com/office/powerpoint/2010/main" val="2246776872"/>
-      </p:ext>
-    </p:extLst>
   </p:cSld>
   <p:clrMapOvr>
     <a:masterClrMapping/>
@@ -359,6 +352,7 @@
               <a:rPr lang="en-US" smtClean="0"/>
               <a:t>Edit Master text styles</a:t>
             </a:r>
+            <a:endParaRPr lang="en-US" smtClean="0"/>
           </a:p>
           <a:p>
             <a:pPr lvl="1"/>
@@ -366,6 +360,7 @@
               <a:rPr lang="en-US" smtClean="0"/>
               <a:t>Second level</a:t>
             </a:r>
+            <a:endParaRPr lang="en-US" smtClean="0"/>
           </a:p>
           <a:p>
             <a:pPr lvl="2"/>
@@ -373,6 +368,7 @@
               <a:rPr lang="en-US" smtClean="0"/>
               <a:t>Third level</a:t>
             </a:r>
+            <a:endParaRPr lang="en-US" smtClean="0"/>
           </a:p>
           <a:p>
             <a:pPr lvl="3"/>
@@ -380,6 +376,7 @@
               <a:rPr lang="en-US" smtClean="0"/>
               <a:t>Fourth level</a:t>
             </a:r>
+            <a:endParaRPr lang="en-US" smtClean="0"/>
           </a:p>
           <a:p>
             <a:pPr lvl="4"/>
@@ -408,7 +405,6 @@
           <a:p>
             <a:fld id="{78099C12-A812-49AC-8A33-AFD6AE6D3516}" type="datetimeFigureOut">
               <a:rPr lang="en-IN" smtClean="0"/>
-              <a:t>07-07-2025</a:t>
             </a:fld>
             <a:endParaRPr lang="en-IN"/>
           </a:p>
@@ -450,18 +446,12 @@
           <a:p>
             <a:fld id="{E6B53E62-7547-4589-B4FC-0807C1B957EC}" type="slidenum">
               <a:rPr lang="en-IN" smtClean="0"/>
-              <a:t>‹#›</a:t>
             </a:fld>
             <a:endParaRPr lang="en-IN"/>
           </a:p>
         </p:txBody>
       </p:sp>
     </p:spTree>
-    <p:extLst>
-      <p:ext uri="{BB962C8B-B14F-4D97-AF65-F5344CB8AC3E}">
-        <p14:creationId xmlns:p14="http://schemas.microsoft.com/office/powerpoint/2010/main" val="1031296530"/>
-      </p:ext>
-    </p:extLst>
   </p:cSld>
   <p:clrMapOvr>
     <a:masterClrMapping/>
@@ -539,6 +529,7 @@
               <a:rPr lang="en-US" smtClean="0"/>
               <a:t>Edit Master text styles</a:t>
             </a:r>
+            <a:endParaRPr lang="en-US" smtClean="0"/>
           </a:p>
           <a:p>
             <a:pPr lvl="1"/>
@@ -546,6 +537,7 @@
               <a:rPr lang="en-US" smtClean="0"/>
               <a:t>Second level</a:t>
             </a:r>
+            <a:endParaRPr lang="en-US" smtClean="0"/>
           </a:p>
           <a:p>
             <a:pPr lvl="2"/>
@@ -553,6 +545,7 @@
               <a:rPr lang="en-US" smtClean="0"/>
               <a:t>Third level</a:t>
             </a:r>
+            <a:endParaRPr lang="en-US" smtClean="0"/>
           </a:p>
           <a:p>
             <a:pPr lvl="3"/>
@@ -560,6 +553,7 @@
               <a:rPr lang="en-US" smtClean="0"/>
               <a:t>Fourth level</a:t>
             </a:r>
+            <a:endParaRPr lang="en-US" smtClean="0"/>
           </a:p>
           <a:p>
             <a:pPr lvl="4"/>
@@ -588,7 +582,6 @@
           <a:p>
             <a:fld id="{78099C12-A812-49AC-8A33-AFD6AE6D3516}" type="datetimeFigureOut">
               <a:rPr lang="en-IN" smtClean="0"/>
-              <a:t>07-07-2025</a:t>
             </a:fld>
             <a:endParaRPr lang="en-IN"/>
           </a:p>
@@ -630,18 +623,12 @@
           <a:p>
             <a:fld id="{E6B53E62-7547-4589-B4FC-0807C1B957EC}" type="slidenum">
               <a:rPr lang="en-IN" smtClean="0"/>
-              <a:t>‹#›</a:t>
             </a:fld>
             <a:endParaRPr lang="en-IN"/>
           </a:p>
         </p:txBody>
       </p:sp>
     </p:spTree>
-    <p:extLst>
-      <p:ext uri="{BB962C8B-B14F-4D97-AF65-F5344CB8AC3E}">
-        <p14:creationId xmlns:p14="http://schemas.microsoft.com/office/powerpoint/2010/main" val="2879102320"/>
-      </p:ext>
-    </p:extLst>
   </p:cSld>
   <p:clrMapOvr>
     <a:masterClrMapping/>
@@ -709,6 +696,7 @@
               <a:rPr lang="en-US" smtClean="0"/>
               <a:t>Edit Master text styles</a:t>
             </a:r>
+            <a:endParaRPr lang="en-US" smtClean="0"/>
           </a:p>
           <a:p>
             <a:pPr lvl="1"/>
@@ -716,6 +704,7 @@
               <a:rPr lang="en-US" smtClean="0"/>
               <a:t>Second level</a:t>
             </a:r>
+            <a:endParaRPr lang="en-US" smtClean="0"/>
           </a:p>
           <a:p>
             <a:pPr lvl="2"/>
@@ -723,6 +712,7 @@
               <a:rPr lang="en-US" smtClean="0"/>
               <a:t>Third level</a:t>
             </a:r>
+            <a:endParaRPr lang="en-US" smtClean="0"/>
           </a:p>
           <a:p>
             <a:pPr lvl="3"/>
@@ -730,6 +720,7 @@
               <a:rPr lang="en-US" smtClean="0"/>
               <a:t>Fourth level</a:t>
             </a:r>
+            <a:endParaRPr lang="en-US" smtClean="0"/>
           </a:p>
           <a:p>
             <a:pPr lvl="4"/>
@@ -758,7 +749,6 @@
           <a:p>
             <a:fld id="{78099C12-A812-49AC-8A33-AFD6AE6D3516}" type="datetimeFigureOut">
               <a:rPr lang="en-IN" smtClean="0"/>
-              <a:t>07-07-2025</a:t>
             </a:fld>
             <a:endParaRPr lang="en-IN"/>
           </a:p>
@@ -800,18 +790,12 @@
           <a:p>
             <a:fld id="{E6B53E62-7547-4589-B4FC-0807C1B957EC}" type="slidenum">
               <a:rPr lang="en-IN" smtClean="0"/>
-              <a:t>‹#›</a:t>
             </a:fld>
             <a:endParaRPr lang="en-IN"/>
           </a:p>
         </p:txBody>
       </p:sp>
     </p:spTree>
-    <p:extLst>
-      <p:ext uri="{BB962C8B-B14F-4D97-AF65-F5344CB8AC3E}">
-        <p14:creationId xmlns:p14="http://schemas.microsoft.com/office/powerpoint/2010/main" val="832311035"/>
-      </p:ext>
-    </p:extLst>
   </p:cSld>
   <p:clrMapOvr>
     <a:masterClrMapping/>
@@ -984,6 +968,7 @@
               <a:rPr lang="en-US" smtClean="0"/>
               <a:t>Edit Master text styles</a:t>
             </a:r>
+            <a:endParaRPr lang="en-US" smtClean="0"/>
           </a:p>
         </p:txBody>
       </p:sp>
@@ -1004,7 +989,6 @@
           <a:p>
             <a:fld id="{78099C12-A812-49AC-8A33-AFD6AE6D3516}" type="datetimeFigureOut">
               <a:rPr lang="en-IN" smtClean="0"/>
-              <a:t>07-07-2025</a:t>
             </a:fld>
             <a:endParaRPr lang="en-IN"/>
           </a:p>
@@ -1046,18 +1030,12 @@
           <a:p>
             <a:fld id="{E6B53E62-7547-4589-B4FC-0807C1B957EC}" type="slidenum">
               <a:rPr lang="en-IN" smtClean="0"/>
-              <a:t>‹#›</a:t>
             </a:fld>
             <a:endParaRPr lang="en-IN"/>
           </a:p>
         </p:txBody>
       </p:sp>
     </p:spTree>
-    <p:extLst>
-      <p:ext uri="{BB962C8B-B14F-4D97-AF65-F5344CB8AC3E}">
-        <p14:creationId xmlns:p14="http://schemas.microsoft.com/office/powerpoint/2010/main" val="4269629610"/>
-      </p:ext>
-    </p:extLst>
   </p:cSld>
   <p:clrMapOvr>
     <a:masterClrMapping/>
@@ -1130,6 +1108,7 @@
               <a:rPr lang="en-US" smtClean="0"/>
               <a:t>Edit Master text styles</a:t>
             </a:r>
+            <a:endParaRPr lang="en-US" smtClean="0"/>
           </a:p>
           <a:p>
             <a:pPr lvl="1"/>
@@ -1137,6 +1116,7 @@
               <a:rPr lang="en-US" smtClean="0"/>
               <a:t>Second level</a:t>
             </a:r>
+            <a:endParaRPr lang="en-US" smtClean="0"/>
           </a:p>
           <a:p>
             <a:pPr lvl="2"/>
@@ -1144,6 +1124,7 @@
               <a:rPr lang="en-US" smtClean="0"/>
               <a:t>Third level</a:t>
             </a:r>
+            <a:endParaRPr lang="en-US" smtClean="0"/>
           </a:p>
           <a:p>
             <a:pPr lvl="3"/>
@@ -1151,6 +1132,7 @@
               <a:rPr lang="en-US" smtClean="0"/>
               <a:t>Fourth level</a:t>
             </a:r>
+            <a:endParaRPr lang="en-US" smtClean="0"/>
           </a:p>
           <a:p>
             <a:pPr lvl="4"/>
@@ -1187,6 +1169,7 @@
               <a:rPr lang="en-US" smtClean="0"/>
               <a:t>Edit Master text styles</a:t>
             </a:r>
+            <a:endParaRPr lang="en-US" smtClean="0"/>
           </a:p>
           <a:p>
             <a:pPr lvl="1"/>
@@ -1194,6 +1177,7 @@
               <a:rPr lang="en-US" smtClean="0"/>
               <a:t>Second level</a:t>
             </a:r>
+            <a:endParaRPr lang="en-US" smtClean="0"/>
           </a:p>
           <a:p>
             <a:pPr lvl="2"/>
@@ -1201,6 +1185,7 @@
               <a:rPr lang="en-US" smtClean="0"/>
               <a:t>Third level</a:t>
             </a:r>
+            <a:endParaRPr lang="en-US" smtClean="0"/>
           </a:p>
           <a:p>
             <a:pPr lvl="3"/>
@@ -1208,6 +1193,7 @@
               <a:rPr lang="en-US" smtClean="0"/>
               <a:t>Fourth level</a:t>
             </a:r>
+            <a:endParaRPr lang="en-US" smtClean="0"/>
           </a:p>
           <a:p>
             <a:pPr lvl="4"/>
@@ -1236,7 +1222,6 @@
           <a:p>
             <a:fld id="{78099C12-A812-49AC-8A33-AFD6AE6D3516}" type="datetimeFigureOut">
               <a:rPr lang="en-IN" smtClean="0"/>
-              <a:t>07-07-2025</a:t>
             </a:fld>
             <a:endParaRPr lang="en-IN"/>
           </a:p>
@@ -1278,18 +1263,12 @@
           <a:p>
             <a:fld id="{E6B53E62-7547-4589-B4FC-0807C1B957EC}" type="slidenum">
               <a:rPr lang="en-IN" smtClean="0"/>
-              <a:t>‹#›</a:t>
             </a:fld>
             <a:endParaRPr lang="en-IN"/>
           </a:p>
         </p:txBody>
       </p:sp>
     </p:spTree>
-    <p:extLst>
-      <p:ext uri="{BB962C8B-B14F-4D97-AF65-F5344CB8AC3E}">
-        <p14:creationId xmlns:p14="http://schemas.microsoft.com/office/powerpoint/2010/main" val="3267361010"/>
-      </p:ext>
-    </p:extLst>
   </p:cSld>
   <p:clrMapOvr>
     <a:masterClrMapping/>
@@ -1404,6 +1383,7 @@
               <a:rPr lang="en-US" smtClean="0"/>
               <a:t>Edit Master text styles</a:t>
             </a:r>
+            <a:endParaRPr lang="en-US" smtClean="0"/>
           </a:p>
         </p:txBody>
       </p:sp>
@@ -1432,6 +1412,7 @@
               <a:rPr lang="en-US" smtClean="0"/>
               <a:t>Edit Master text styles</a:t>
             </a:r>
+            <a:endParaRPr lang="en-US" smtClean="0"/>
           </a:p>
           <a:p>
             <a:pPr lvl="1"/>
@@ -1439,6 +1420,7 @@
               <a:rPr lang="en-US" smtClean="0"/>
               <a:t>Second level</a:t>
             </a:r>
+            <a:endParaRPr lang="en-US" smtClean="0"/>
           </a:p>
           <a:p>
             <a:pPr lvl="2"/>
@@ -1446,6 +1428,7 @@
               <a:rPr lang="en-US" smtClean="0"/>
               <a:t>Third level</a:t>
             </a:r>
+            <a:endParaRPr lang="en-US" smtClean="0"/>
           </a:p>
           <a:p>
             <a:pPr lvl="3"/>
@@ -1453,6 +1436,7 @@
               <a:rPr lang="en-US" smtClean="0"/>
               <a:t>Fourth level</a:t>
             </a:r>
+            <a:endParaRPr lang="en-US" smtClean="0"/>
           </a:p>
           <a:p>
             <a:pPr lvl="4"/>
@@ -1526,6 +1510,7 @@
               <a:rPr lang="en-US" smtClean="0"/>
               <a:t>Edit Master text styles</a:t>
             </a:r>
+            <a:endParaRPr lang="en-US" smtClean="0"/>
           </a:p>
         </p:txBody>
       </p:sp>
@@ -1554,6 +1539,7 @@
               <a:rPr lang="en-US" smtClean="0"/>
               <a:t>Edit Master text styles</a:t>
             </a:r>
+            <a:endParaRPr lang="en-US" smtClean="0"/>
           </a:p>
           <a:p>
             <a:pPr lvl="1"/>
@@ -1561,6 +1547,7 @@
               <a:rPr lang="en-US" smtClean="0"/>
               <a:t>Second level</a:t>
             </a:r>
+            <a:endParaRPr lang="en-US" smtClean="0"/>
           </a:p>
           <a:p>
             <a:pPr lvl="2"/>
@@ -1568,6 +1555,7 @@
               <a:rPr lang="en-US" smtClean="0"/>
               <a:t>Third level</a:t>
             </a:r>
+            <a:endParaRPr lang="en-US" smtClean="0"/>
           </a:p>
           <a:p>
             <a:pPr lvl="3"/>
@@ -1575,6 +1563,7 @@
               <a:rPr lang="en-US" smtClean="0"/>
               <a:t>Fourth level</a:t>
             </a:r>
+            <a:endParaRPr lang="en-US" smtClean="0"/>
           </a:p>
           <a:p>
             <a:pPr lvl="4"/>
@@ -1603,7 +1592,6 @@
           <a:p>
             <a:fld id="{78099C12-A812-49AC-8A33-AFD6AE6D3516}" type="datetimeFigureOut">
               <a:rPr lang="en-IN" smtClean="0"/>
-              <a:t>07-07-2025</a:t>
             </a:fld>
             <a:endParaRPr lang="en-IN"/>
           </a:p>
@@ -1645,18 +1633,12 @@
           <a:p>
             <a:fld id="{E6B53E62-7547-4589-B4FC-0807C1B957EC}" type="slidenum">
               <a:rPr lang="en-IN" smtClean="0"/>
-              <a:t>‹#›</a:t>
             </a:fld>
             <a:endParaRPr lang="en-IN"/>
           </a:p>
         </p:txBody>
       </p:sp>
     </p:spTree>
-    <p:extLst>
-      <p:ext uri="{BB962C8B-B14F-4D97-AF65-F5344CB8AC3E}">
-        <p14:creationId xmlns:p14="http://schemas.microsoft.com/office/powerpoint/2010/main" val="3391043672"/>
-      </p:ext>
-    </p:extLst>
   </p:cSld>
   <p:clrMapOvr>
     <a:masterClrMapping/>
@@ -1721,7 +1703,6 @@
           <a:p>
             <a:fld id="{78099C12-A812-49AC-8A33-AFD6AE6D3516}" type="datetimeFigureOut">
               <a:rPr lang="en-IN" smtClean="0"/>
-              <a:t>07-07-2025</a:t>
             </a:fld>
             <a:endParaRPr lang="en-IN"/>
           </a:p>
@@ -1763,18 +1744,12 @@
           <a:p>
             <a:fld id="{E6B53E62-7547-4589-B4FC-0807C1B957EC}" type="slidenum">
               <a:rPr lang="en-IN" smtClean="0"/>
-              <a:t>‹#›</a:t>
             </a:fld>
             <a:endParaRPr lang="en-IN"/>
           </a:p>
         </p:txBody>
       </p:sp>
     </p:spTree>
-    <p:extLst>
-      <p:ext uri="{BB962C8B-B14F-4D97-AF65-F5344CB8AC3E}">
-        <p14:creationId xmlns:p14="http://schemas.microsoft.com/office/powerpoint/2010/main" val="2252305836"/>
-      </p:ext>
-    </p:extLst>
   </p:cSld>
   <p:clrMapOvr>
     <a:masterClrMapping/>
@@ -1816,7 +1791,6 @@
           <a:p>
             <a:fld id="{78099C12-A812-49AC-8A33-AFD6AE6D3516}" type="datetimeFigureOut">
               <a:rPr lang="en-IN" smtClean="0"/>
-              <a:t>07-07-2025</a:t>
             </a:fld>
             <a:endParaRPr lang="en-IN"/>
           </a:p>
@@ -1858,18 +1832,12 @@
           <a:p>
             <a:fld id="{E6B53E62-7547-4589-B4FC-0807C1B957EC}" type="slidenum">
               <a:rPr lang="en-IN" smtClean="0"/>
-              <a:t>‹#›</a:t>
             </a:fld>
             <a:endParaRPr lang="en-IN"/>
           </a:p>
         </p:txBody>
       </p:sp>
     </p:spTree>
-    <p:extLst>
-      <p:ext uri="{BB962C8B-B14F-4D97-AF65-F5344CB8AC3E}">
-        <p14:creationId xmlns:p14="http://schemas.microsoft.com/office/powerpoint/2010/main" val="3029229785"/>
-      </p:ext>
-    </p:extLst>
   </p:cSld>
   <p:clrMapOvr>
     <a:masterClrMapping/>
@@ -1979,6 +1947,7 @@
               <a:rPr lang="en-US" smtClean="0"/>
               <a:t>Edit Master text styles</a:t>
             </a:r>
+            <a:endParaRPr lang="en-US" smtClean="0"/>
           </a:p>
           <a:p>
             <a:pPr lvl="1"/>
@@ -1986,6 +1955,7 @@
               <a:rPr lang="en-US" smtClean="0"/>
               <a:t>Second level</a:t>
             </a:r>
+            <a:endParaRPr lang="en-US" smtClean="0"/>
           </a:p>
           <a:p>
             <a:pPr lvl="2"/>
@@ -1993,6 +1963,7 @@
               <a:rPr lang="en-US" smtClean="0"/>
               <a:t>Third level</a:t>
             </a:r>
+            <a:endParaRPr lang="en-US" smtClean="0"/>
           </a:p>
           <a:p>
             <a:pPr lvl="3"/>
@@ -2000,6 +1971,7 @@
               <a:rPr lang="en-US" smtClean="0"/>
               <a:t>Fourth level</a:t>
             </a:r>
+            <a:endParaRPr lang="en-US" smtClean="0"/>
           </a:p>
           <a:p>
             <a:pPr lvl="4"/>
@@ -2073,6 +2045,7 @@
               <a:rPr lang="en-US" smtClean="0"/>
               <a:t>Edit Master text styles</a:t>
             </a:r>
+            <a:endParaRPr lang="en-US" smtClean="0"/>
           </a:p>
         </p:txBody>
       </p:sp>
@@ -2093,7 +2066,6 @@
           <a:p>
             <a:fld id="{78099C12-A812-49AC-8A33-AFD6AE6D3516}" type="datetimeFigureOut">
               <a:rPr lang="en-IN" smtClean="0"/>
-              <a:t>07-07-2025</a:t>
             </a:fld>
             <a:endParaRPr lang="en-IN"/>
           </a:p>
@@ -2135,18 +2107,12 @@
           <a:p>
             <a:fld id="{E6B53E62-7547-4589-B4FC-0807C1B957EC}" type="slidenum">
               <a:rPr lang="en-IN" smtClean="0"/>
-              <a:t>‹#›</a:t>
             </a:fld>
             <a:endParaRPr lang="en-IN"/>
           </a:p>
         </p:txBody>
       </p:sp>
     </p:spTree>
-    <p:extLst>
-      <p:ext uri="{BB962C8B-B14F-4D97-AF65-F5344CB8AC3E}">
-        <p14:creationId xmlns:p14="http://schemas.microsoft.com/office/powerpoint/2010/main" val="3111886169"/>
-      </p:ext>
-    </p:extLst>
   </p:cSld>
   <p:clrMapOvr>
     <a:masterClrMapping/>
@@ -2326,6 +2292,7 @@
               <a:rPr lang="en-US" smtClean="0"/>
               <a:t>Edit Master text styles</a:t>
             </a:r>
+            <a:endParaRPr lang="en-US" smtClean="0"/>
           </a:p>
         </p:txBody>
       </p:sp>
@@ -2346,7 +2313,6 @@
           <a:p>
             <a:fld id="{78099C12-A812-49AC-8A33-AFD6AE6D3516}" type="datetimeFigureOut">
               <a:rPr lang="en-IN" smtClean="0"/>
-              <a:t>07-07-2025</a:t>
             </a:fld>
             <a:endParaRPr lang="en-IN"/>
           </a:p>
@@ -2388,18 +2354,12 @@
           <a:p>
             <a:fld id="{E6B53E62-7547-4589-B4FC-0807C1B957EC}" type="slidenum">
               <a:rPr lang="en-IN" smtClean="0"/>
-              <a:t>‹#›</a:t>
             </a:fld>
             <a:endParaRPr lang="en-IN"/>
           </a:p>
         </p:txBody>
       </p:sp>
     </p:spTree>
-    <p:extLst>
-      <p:ext uri="{BB962C8B-B14F-4D97-AF65-F5344CB8AC3E}">
-        <p14:creationId xmlns:p14="http://schemas.microsoft.com/office/powerpoint/2010/main" val="477555928"/>
-      </p:ext>
-    </p:extLst>
   </p:cSld>
   <p:clrMapOvr>
     <a:masterClrMapping/>
@@ -2492,6 +2452,7 @@
               <a:rPr lang="en-US" smtClean="0"/>
               <a:t>Edit Master text styles</a:t>
             </a:r>
+            <a:endParaRPr lang="en-US" smtClean="0"/>
           </a:p>
           <a:p>
             <a:pPr lvl="1"/>
@@ -2499,6 +2460,7 @@
               <a:rPr lang="en-US" smtClean="0"/>
               <a:t>Second level</a:t>
             </a:r>
+            <a:endParaRPr lang="en-US" smtClean="0"/>
           </a:p>
           <a:p>
             <a:pPr lvl="2"/>
@@ -2506,6 +2468,7 @@
               <a:rPr lang="en-US" smtClean="0"/>
               <a:t>Third level</a:t>
             </a:r>
+            <a:endParaRPr lang="en-US" smtClean="0"/>
           </a:p>
           <a:p>
             <a:pPr lvl="3"/>
@@ -2513,6 +2476,7 @@
               <a:rPr lang="en-US" smtClean="0"/>
               <a:t>Fourth level</a:t>
             </a:r>
+            <a:endParaRPr lang="en-US" smtClean="0"/>
           </a:p>
           <a:p>
             <a:pPr lvl="4"/>
@@ -2559,7 +2523,6 @@
           <a:p>
             <a:fld id="{78099C12-A812-49AC-8A33-AFD6AE6D3516}" type="datetimeFigureOut">
               <a:rPr lang="en-IN" smtClean="0"/>
-              <a:t>07-07-2025</a:t>
             </a:fld>
             <a:endParaRPr lang="en-IN"/>
           </a:p>
@@ -2637,18 +2600,12 @@
           <a:p>
             <a:fld id="{E6B53E62-7547-4589-B4FC-0807C1B957EC}" type="slidenum">
               <a:rPr lang="en-IN" smtClean="0"/>
-              <a:t>‹#›</a:t>
             </a:fld>
             <a:endParaRPr lang="en-IN"/>
           </a:p>
         </p:txBody>
       </p:sp>
     </p:spTree>
-    <p:extLst>
-      <p:ext uri="{BB962C8B-B14F-4D97-AF65-F5344CB8AC3E}">
-        <p14:creationId xmlns:p14="http://schemas.microsoft.com/office/powerpoint/2010/main" val="96913635"/>
-      </p:ext>
-    </p:extLst>
   </p:cSld>
   <p:clrMap bg1="lt1" tx1="dk1" bg2="lt2" tx2="dk2" accent1="accent1" accent2="accent2" accent3="accent3" accent4="accent4" accent5="accent5" accent6="accent6" hlink="hlink" folHlink="folHlink"/>
   <p:sldLayoutIdLst>
@@ -3029,6 +2986,7 @@
               <a:rPr lang="en-IN" dirty="0" smtClean="0"/>
               <a:t>Ex : Input array</a:t>
             </a:r>
+            <a:endParaRPr lang="en-IN" dirty="0" smtClean="0"/>
           </a:p>
           <a:p>
             <a:pPr algn="l"/>
@@ -3044,6 +3002,7 @@
               <a:rPr lang="en-IN" dirty="0" smtClean="0"/>
               <a:t>}</a:t>
             </a:r>
+            <a:endParaRPr lang="en-IN" dirty="0" smtClean="0"/>
           </a:p>
           <a:p>
             <a:pPr algn="l"/>
@@ -3059,6 +3018,7 @@
               <a:rPr lang="en-IN" dirty="0" smtClean="0"/>
               <a:t>Answer : 6 Pairs</a:t>
             </a:r>
+            <a:endParaRPr lang="en-IN" dirty="0" smtClean="0"/>
           </a:p>
           <a:p>
             <a:pPr algn="l"/>
@@ -3066,6 +3026,7 @@
               <a:rPr lang="en-IN" dirty="0" smtClean="0"/>
               <a:t>Explanation : </a:t>
             </a:r>
+            <a:endParaRPr lang="en-IN" dirty="0" smtClean="0"/>
           </a:p>
           <a:p>
             <a:pPr algn="l"/>
@@ -3073,6 +3034,7 @@
               <a:rPr lang="en-IN" dirty="0" smtClean="0"/>
               <a:t>A at index 0 will make 3 pairs[(0,4)(0,7),(0,9)]</a:t>
             </a:r>
+            <a:endParaRPr lang="en-IN" dirty="0" smtClean="0"/>
           </a:p>
           <a:p>
             <a:pPr algn="l"/>
@@ -3080,6 +3042,7 @@
               <a:rPr lang="en-IN" dirty="0" smtClean="0"/>
               <a:t>A at index 5 will make 2 pairs[(5,7),(5,9)]</a:t>
             </a:r>
+            <a:endParaRPr lang="en-IN" dirty="0" smtClean="0"/>
           </a:p>
           <a:p>
             <a:pPr algn="l"/>
@@ -3087,12 +3050,17 @@
               <a:rPr lang="en-IN" dirty="0" smtClean="0"/>
               <a:t>A at index 8 will make 1 pairs[(8,,9)]</a:t>
             </a:r>
+            <a:endParaRPr lang="en-IN" dirty="0" smtClean="0"/>
           </a:p>
           <a:p>
             <a:pPr algn="l"/>
             <a:r>
               <a:rPr lang="en-IN" dirty="0" smtClean="0"/>
               <a:t>Answer = 3 + 2 + 1</a:t>
+            </a:r>
+            <a:r>
+              <a:rPr lang="en-US" altLang="en-IN" dirty="0" smtClean="0"/>
+              <a:t>.</a:t>
             </a:r>
             <a:endParaRPr lang="en-IN" dirty="0" smtClean="0"/>
           </a:p>
@@ -3116,13 +3084,7 @@
           <p:cNvGraphicFramePr>
             <a:graphicFrameLocks noGrp="1"/>
           </p:cNvGraphicFramePr>
-          <p:nvPr>
-            <p:extLst>
-              <p:ext uri="{D42A27DB-BD31-4B8C-83A1-F6EECF244321}">
-                <p14:modId xmlns:p14="http://schemas.microsoft.com/office/powerpoint/2010/main" val="3591458598"/>
-              </p:ext>
-            </p:extLst>
-          </p:nvPr>
+          <p:nvPr/>
         </p:nvGraphicFramePr>
         <p:xfrm>
           <a:off x="1524000" y="2995657"/>
@@ -3135,76 +3097,16 @@
                 <a:tableStyleId>{5C22544A-7EE6-4342-B048-85BDC9FD1C3A}</a:tableStyleId>
               </a:tblPr>
               <a:tblGrid>
-                <a:gridCol w="801511">
-                  <a:extLst>
-                    <a:ext uri="{9D8B030D-6E8A-4147-A177-3AD203B41FA5}">
-                      <a16:colId xmlns:a16="http://schemas.microsoft.com/office/drawing/2014/main" val="44730622"/>
-                    </a:ext>
-                  </a:extLst>
-                </a:gridCol>
-                <a:gridCol w="824089">
-                  <a:extLst>
-                    <a:ext uri="{9D8B030D-6E8A-4147-A177-3AD203B41FA5}">
-                      <a16:colId xmlns:a16="http://schemas.microsoft.com/office/drawing/2014/main" val="2820611948"/>
-                    </a:ext>
-                  </a:extLst>
-                </a:gridCol>
-                <a:gridCol w="812800">
-                  <a:extLst>
-                    <a:ext uri="{9D8B030D-6E8A-4147-A177-3AD203B41FA5}">
-                      <a16:colId xmlns:a16="http://schemas.microsoft.com/office/drawing/2014/main" val="1613695636"/>
-                    </a:ext>
-                  </a:extLst>
-                </a:gridCol>
-                <a:gridCol w="812800">
-                  <a:extLst>
-                    <a:ext uri="{9D8B030D-6E8A-4147-A177-3AD203B41FA5}">
-                      <a16:colId xmlns:a16="http://schemas.microsoft.com/office/drawing/2014/main" val="709399231"/>
-                    </a:ext>
-                  </a:extLst>
-                </a:gridCol>
-                <a:gridCol w="812800">
-                  <a:extLst>
-                    <a:ext uri="{9D8B030D-6E8A-4147-A177-3AD203B41FA5}">
-                      <a16:colId xmlns:a16="http://schemas.microsoft.com/office/drawing/2014/main" val="4005383256"/>
-                    </a:ext>
-                  </a:extLst>
-                </a:gridCol>
-                <a:gridCol w="812800">
-                  <a:extLst>
-                    <a:ext uri="{9D8B030D-6E8A-4147-A177-3AD203B41FA5}">
-                      <a16:colId xmlns:a16="http://schemas.microsoft.com/office/drawing/2014/main" val="1078648346"/>
-                    </a:ext>
-                  </a:extLst>
-                </a:gridCol>
-                <a:gridCol w="812800">
-                  <a:extLst>
-                    <a:ext uri="{9D8B030D-6E8A-4147-A177-3AD203B41FA5}">
-                      <a16:colId xmlns:a16="http://schemas.microsoft.com/office/drawing/2014/main" val="569774121"/>
-                    </a:ext>
-                  </a:extLst>
-                </a:gridCol>
-                <a:gridCol w="812800">
-                  <a:extLst>
-                    <a:ext uri="{9D8B030D-6E8A-4147-A177-3AD203B41FA5}">
-                      <a16:colId xmlns:a16="http://schemas.microsoft.com/office/drawing/2014/main" val="2619351050"/>
-                    </a:ext>
-                  </a:extLst>
-                </a:gridCol>
-                <a:gridCol w="812800">
-                  <a:extLst>
-                    <a:ext uri="{9D8B030D-6E8A-4147-A177-3AD203B41FA5}">
-                      <a16:colId xmlns:a16="http://schemas.microsoft.com/office/drawing/2014/main" val="1898211882"/>
-                    </a:ext>
-                  </a:extLst>
-                </a:gridCol>
-                <a:gridCol w="812800">
-                  <a:extLst>
-                    <a:ext uri="{9D8B030D-6E8A-4147-A177-3AD203B41FA5}">
-                      <a16:colId xmlns:a16="http://schemas.microsoft.com/office/drawing/2014/main" val="209911453"/>
-                    </a:ext>
-                  </a:extLst>
-                </a:gridCol>
+                <a:gridCol w="801511"/>
+                <a:gridCol w="824089"/>
+                <a:gridCol w="812800"/>
+                <a:gridCol w="812800"/>
+                <a:gridCol w="812800"/>
+                <a:gridCol w="812800"/>
+                <a:gridCol w="812800"/>
+                <a:gridCol w="812800"/>
+                <a:gridCol w="812800"/>
+                <a:gridCol w="812800"/>
               </a:tblGrid>
               <a:tr h="0">
                 <a:tc>
@@ -3417,11 +3319,6 @@
                     </a:solidFill>
                   </a:tcPr>
                 </a:tc>
-                <a:extLst>
-                  <a:ext uri="{0D108BD9-81ED-4DB2-BD59-A6C34878D82A}">
-                    <a16:rowId xmlns:a16="http://schemas.microsoft.com/office/drawing/2014/main" val="2028026598"/>
-                  </a:ext>
-                </a:extLst>
               </a:tr>
               <a:tr h="0">
                 <a:tc>
@@ -3634,22 +3531,12 @@
                     </a:solidFill>
                   </a:tcPr>
                 </a:tc>
-                <a:extLst>
-                  <a:ext uri="{0D108BD9-81ED-4DB2-BD59-A6C34878D82A}">
-                    <a16:rowId xmlns:a16="http://schemas.microsoft.com/office/drawing/2014/main" val="11513615"/>
-                  </a:ext>
-                </a:extLst>
               </a:tr>
             </a:tbl>
           </a:graphicData>
         </a:graphic>
       </p:graphicFrame>
     </p:spTree>
-    <p:extLst>
-      <p:ext uri="{BB962C8B-B14F-4D97-AF65-F5344CB8AC3E}">
-        <p14:creationId xmlns:p14="http://schemas.microsoft.com/office/powerpoint/2010/main" val="769424489"/>
-      </p:ext>
-    </p:extLst>
   </p:cSld>
   <p:clrMapOvr>
     <a:masterClrMapping/>
@@ -3707,7 +3594,7 @@
     </a:clrScheme>
     <a:fontScheme name="Office">
       <a:majorFont>
-        <a:latin typeface="Calibri Light" panose="020F0302020204030204"/>
+        <a:latin typeface="Calibri Light"/>
         <a:ea typeface=""/>
         <a:cs typeface=""/>
         <a:font script="Jpan" typeface="游ゴシック Light"/>
@@ -3742,7 +3629,7 @@
         <a:font script="Geor" typeface="Sylfaen"/>
       </a:majorFont>
       <a:minorFont>
-        <a:latin typeface="Calibri" panose="020F0502020204030204"/>
+        <a:latin typeface="Calibri"/>
         <a:ea typeface=""/>
         <a:cs typeface=""/>
         <a:font script="Jpan" typeface="游ゴシック"/>
@@ -3915,8 +3802,6 @@
       </a:bgFillStyleLst>
     </a:fmtScheme>
   </a:themeElements>
-  <a:objectDefaults/>
-  <a:extraClrSchemeLst/>
   <a:extLst>
     <a:ext uri="{05A4C25C-085E-4340-85A3-A5531E510DB2}">
       <thm15:themeFamily xmlns:thm15="http://schemas.microsoft.com/office/thememl/2012/main" name="Office Theme" id="{62F939B6-93AF-4DB8-9C6B-D6C7DFDC589F}" vid="{4A3C46E8-61CC-4603-A589-7422A47A8E4A}"/>

</xml_diff>